<commit_message>
updates to figures and fig scripts
</commit_message>
<xml_diff>
--- a/figures/figure2.pptx
+++ b/figures/figure2.pptx
@@ -104,6 +104,11 @@
       </a:defRPr>
     </a:lvl9pPr>
   </p:defaultTextStyle>
+  <p:extLst>
+    <p:ext uri="{EFAFB233-063F-42B5-8137-9DF3F51BA10A}">
+      <p15:sldGuideLst xmlns:p15="http://schemas.microsoft.com/office/powerpoint/2012/main"/>
+    </p:ext>
+  </p:extLst>
 </p:presentation>
 </file>
 
@@ -254,7 +259,7 @@
           <a:p>
             <a:fld id="{FB126E3B-FB93-A84E-B9FE-AB0F06BE8661}" type="datetimeFigureOut">
               <a:rPr lang="en-US" smtClean="0"/>
-              <a:t>9/17/24</a:t>
+              <a:t>9/19/24</a:t>
             </a:fld>
             <a:endParaRPr lang="en-US"/>
           </a:p>
@@ -452,7 +457,7 @@
           <a:p>
             <a:fld id="{FB126E3B-FB93-A84E-B9FE-AB0F06BE8661}" type="datetimeFigureOut">
               <a:rPr lang="en-US" smtClean="0"/>
-              <a:t>9/17/24</a:t>
+              <a:t>9/19/24</a:t>
             </a:fld>
             <a:endParaRPr lang="en-US"/>
           </a:p>
@@ -660,7 +665,7 @@
           <a:p>
             <a:fld id="{FB126E3B-FB93-A84E-B9FE-AB0F06BE8661}" type="datetimeFigureOut">
               <a:rPr lang="en-US" smtClean="0"/>
-              <a:t>9/17/24</a:t>
+              <a:t>9/19/24</a:t>
             </a:fld>
             <a:endParaRPr lang="en-US"/>
           </a:p>
@@ -858,7 +863,7 @@
           <a:p>
             <a:fld id="{FB126E3B-FB93-A84E-B9FE-AB0F06BE8661}" type="datetimeFigureOut">
               <a:rPr lang="en-US" smtClean="0"/>
-              <a:t>9/17/24</a:t>
+              <a:t>9/19/24</a:t>
             </a:fld>
             <a:endParaRPr lang="en-US"/>
           </a:p>
@@ -1133,7 +1138,7 @@
           <a:p>
             <a:fld id="{FB126E3B-FB93-A84E-B9FE-AB0F06BE8661}" type="datetimeFigureOut">
               <a:rPr lang="en-US" smtClean="0"/>
-              <a:t>9/17/24</a:t>
+              <a:t>9/19/24</a:t>
             </a:fld>
             <a:endParaRPr lang="en-US"/>
           </a:p>
@@ -1398,7 +1403,7 @@
           <a:p>
             <a:fld id="{FB126E3B-FB93-A84E-B9FE-AB0F06BE8661}" type="datetimeFigureOut">
               <a:rPr lang="en-US" smtClean="0"/>
-              <a:t>9/17/24</a:t>
+              <a:t>9/19/24</a:t>
             </a:fld>
             <a:endParaRPr lang="en-US"/>
           </a:p>
@@ -1810,7 +1815,7 @@
           <a:p>
             <a:fld id="{FB126E3B-FB93-A84E-B9FE-AB0F06BE8661}" type="datetimeFigureOut">
               <a:rPr lang="en-US" smtClean="0"/>
-              <a:t>9/17/24</a:t>
+              <a:t>9/19/24</a:t>
             </a:fld>
             <a:endParaRPr lang="en-US"/>
           </a:p>
@@ -1951,7 +1956,7 @@
           <a:p>
             <a:fld id="{FB126E3B-FB93-A84E-B9FE-AB0F06BE8661}" type="datetimeFigureOut">
               <a:rPr lang="en-US" smtClean="0"/>
-              <a:t>9/17/24</a:t>
+              <a:t>9/19/24</a:t>
             </a:fld>
             <a:endParaRPr lang="en-US"/>
           </a:p>
@@ -2064,7 +2069,7 @@
           <a:p>
             <a:fld id="{FB126E3B-FB93-A84E-B9FE-AB0F06BE8661}" type="datetimeFigureOut">
               <a:rPr lang="en-US" smtClean="0"/>
-              <a:t>9/17/24</a:t>
+              <a:t>9/19/24</a:t>
             </a:fld>
             <a:endParaRPr lang="en-US"/>
           </a:p>
@@ -2375,7 +2380,7 @@
           <a:p>
             <a:fld id="{FB126E3B-FB93-A84E-B9FE-AB0F06BE8661}" type="datetimeFigureOut">
               <a:rPr lang="en-US" smtClean="0"/>
-              <a:t>9/17/24</a:t>
+              <a:t>9/19/24</a:t>
             </a:fld>
             <a:endParaRPr lang="en-US"/>
           </a:p>
@@ -2663,7 +2668,7 @@
           <a:p>
             <a:fld id="{FB126E3B-FB93-A84E-B9FE-AB0F06BE8661}" type="datetimeFigureOut">
               <a:rPr lang="en-US" smtClean="0"/>
-              <a:t>9/17/24</a:t>
+              <a:t>9/19/24</a:t>
             </a:fld>
             <a:endParaRPr lang="en-US"/>
           </a:p>
@@ -2904,7 +2909,7 @@
           <a:p>
             <a:fld id="{FB126E3B-FB93-A84E-B9FE-AB0F06BE8661}" type="datetimeFigureOut">
               <a:rPr lang="en-US" smtClean="0"/>
-              <a:t>9/17/24</a:t>
+              <a:t>9/19/24</a:t>
             </a:fld>
             <a:endParaRPr lang="en-US"/>
           </a:p>
@@ -3321,12 +3326,117 @@
           <a:chExt cx="0" cy="0"/>
         </a:xfrm>
       </p:grpSpPr>
+      <p:sp>
+        <p:nvSpPr>
+          <p:cNvPr id="10" name="TextBox 9">
+            <a:extLst>
+              <a:ext uri="{FF2B5EF4-FFF2-40B4-BE49-F238E27FC236}">
+                <a16:creationId xmlns:a16="http://schemas.microsoft.com/office/drawing/2014/main" id="{24BC0C04-5024-2076-BAFF-E620D13CE90B}"/>
+              </a:ext>
+            </a:extLst>
+          </p:cNvPr>
+          <p:cNvSpPr txBox="1"/>
+          <p:nvPr/>
+        </p:nvSpPr>
+        <p:spPr>
+          <a:xfrm>
+            <a:off x="2667000" y="0"/>
+            <a:ext cx="327334" cy="369332"/>
+          </a:xfrm>
+          <a:prstGeom prst="rect">
+            <a:avLst/>
+          </a:prstGeom>
+          <a:noFill/>
+        </p:spPr>
+        <p:txBody>
+          <a:bodyPr wrap="none" rtlCol="0">
+            <a:spAutoFit/>
+          </a:bodyPr>
+          <a:lstStyle/>
+          <a:p>
+            <a:r>
+              <a:rPr lang="en-US" b="1" dirty="0"/>
+              <a:t>A</a:t>
+            </a:r>
+          </a:p>
+        </p:txBody>
+      </p:sp>
+      <p:sp>
+        <p:nvSpPr>
+          <p:cNvPr id="11" name="TextBox 10">
+            <a:extLst>
+              <a:ext uri="{FF2B5EF4-FFF2-40B4-BE49-F238E27FC236}">
+                <a16:creationId xmlns:a16="http://schemas.microsoft.com/office/drawing/2014/main" id="{E912BDF5-E504-6125-C8B1-0D5C2CB98691}"/>
+              </a:ext>
+            </a:extLst>
+          </p:cNvPr>
+          <p:cNvSpPr txBox="1"/>
+          <p:nvPr/>
+        </p:nvSpPr>
+        <p:spPr>
+          <a:xfrm>
+            <a:off x="6096000" y="0"/>
+            <a:ext cx="327334" cy="369332"/>
+          </a:xfrm>
+          <a:prstGeom prst="rect">
+            <a:avLst/>
+          </a:prstGeom>
+          <a:noFill/>
+        </p:spPr>
+        <p:txBody>
+          <a:bodyPr wrap="none" rtlCol="0">
+            <a:spAutoFit/>
+          </a:bodyPr>
+          <a:lstStyle/>
+          <a:p>
+            <a:r>
+              <a:rPr lang="en-US" b="1" dirty="0"/>
+              <a:t>B</a:t>
+            </a:r>
+          </a:p>
+        </p:txBody>
+      </p:sp>
+      <p:sp>
+        <p:nvSpPr>
+          <p:cNvPr id="12" name="TextBox 11">
+            <a:extLst>
+              <a:ext uri="{FF2B5EF4-FFF2-40B4-BE49-F238E27FC236}">
+                <a16:creationId xmlns:a16="http://schemas.microsoft.com/office/drawing/2014/main" id="{623B0483-8F15-8F96-3ABB-C72B6809154E}"/>
+              </a:ext>
+            </a:extLst>
+          </p:cNvPr>
+          <p:cNvSpPr txBox="1"/>
+          <p:nvPr/>
+        </p:nvSpPr>
+        <p:spPr>
+          <a:xfrm>
+            <a:off x="6087184" y="3244334"/>
+            <a:ext cx="344966" cy="369332"/>
+          </a:xfrm>
+          <a:prstGeom prst="rect">
+            <a:avLst/>
+          </a:prstGeom>
+          <a:noFill/>
+        </p:spPr>
+        <p:txBody>
+          <a:bodyPr wrap="none" rtlCol="0">
+            <a:spAutoFit/>
+          </a:bodyPr>
+          <a:lstStyle/>
+          <a:p>
+            <a:r>
+              <a:rPr lang="en-US" b="1" dirty="0"/>
+              <a:t>C</a:t>
+            </a:r>
+          </a:p>
+        </p:txBody>
+      </p:sp>
       <p:pic>
         <p:nvPicPr>
-          <p:cNvPr id="5" name="Picture 4">
-            <a:extLst>
-              <a:ext uri="{FF2B5EF4-FFF2-40B4-BE49-F238E27FC236}">
-                <a16:creationId xmlns:a16="http://schemas.microsoft.com/office/drawing/2014/main" id="{1E12461A-82E0-D8D9-8BB1-CFA4095EFD87}"/>
+          <p:cNvPr id="3" name="Picture 2">
+            <a:extLst>
+              <a:ext uri="{FF2B5EF4-FFF2-40B4-BE49-F238E27FC236}">
+                <a16:creationId xmlns:a16="http://schemas.microsoft.com/office/drawing/2014/main" id="{FB44B62E-E8B1-3B91-A986-E1C121ED02C1}"/>
               </a:ext>
             </a:extLst>
           </p:cNvPr>
@@ -3343,8 +3453,8 @@
         </p:blipFill>
         <p:spPr>
           <a:xfrm>
-            <a:off x="6096000" y="3337035"/>
-            <a:ext cx="3429000" cy="3429000"/>
+            <a:off x="2895600" y="228600"/>
+            <a:ext cx="0" cy="0"/>
           </a:xfrm>
           <a:prstGeom prst="rect">
             <a:avLst/>
@@ -3353,10 +3463,10 @@
       </p:pic>
       <p:pic>
         <p:nvPicPr>
-          <p:cNvPr id="7" name="Picture 6">
-            <a:extLst>
-              <a:ext uri="{FF2B5EF4-FFF2-40B4-BE49-F238E27FC236}">
-                <a16:creationId xmlns:a16="http://schemas.microsoft.com/office/drawing/2014/main" id="{D012E5DA-8C9B-A379-9F72-D350EA4792EF}"/>
+          <p:cNvPr id="17" name="Picture 16">
+            <a:extLst>
+              <a:ext uri="{FF2B5EF4-FFF2-40B4-BE49-F238E27FC236}">
+                <a16:creationId xmlns:a16="http://schemas.microsoft.com/office/drawing/2014/main" id="{CC4F03A0-EB68-BB80-AE57-B62850B41834}"/>
               </a:ext>
             </a:extLst>
           </p:cNvPr>
@@ -3373,7 +3483,7 @@
         </p:blipFill>
         <p:spPr>
           <a:xfrm>
-            <a:off x="2667000" y="0"/>
+            <a:off x="6259667" y="0"/>
             <a:ext cx="3429000" cy="3429000"/>
           </a:xfrm>
           <a:prstGeom prst="rect">
@@ -3383,10 +3493,10 @@
       </p:pic>
       <p:pic>
         <p:nvPicPr>
-          <p:cNvPr id="9" name="Picture 8">
-            <a:extLst>
-              <a:ext uri="{FF2B5EF4-FFF2-40B4-BE49-F238E27FC236}">
-                <a16:creationId xmlns:a16="http://schemas.microsoft.com/office/drawing/2014/main" id="{E5B0E38E-1E14-FAFF-2CC7-15C84278CEC9}"/>
+          <p:cNvPr id="19" name="Picture 18">
+            <a:extLst>
+              <a:ext uri="{FF2B5EF4-FFF2-40B4-BE49-F238E27FC236}">
+                <a16:creationId xmlns:a16="http://schemas.microsoft.com/office/drawing/2014/main" id="{063AF34D-4011-6ABA-2877-A2236CE6FCCD}"/>
               </a:ext>
             </a:extLst>
           </p:cNvPr>
@@ -3403,7 +3513,7 @@
         </p:blipFill>
         <p:spPr>
           <a:xfrm>
-            <a:off x="6096000" y="0"/>
+            <a:off x="2830667" y="0"/>
             <a:ext cx="3429000" cy="3429000"/>
           </a:xfrm>
           <a:prstGeom prst="rect">
@@ -3411,111 +3521,36 @@
           </a:prstGeom>
         </p:spPr>
       </p:pic>
-      <p:sp>
-        <p:nvSpPr>
-          <p:cNvPr id="10" name="TextBox 9">
-            <a:extLst>
-              <a:ext uri="{FF2B5EF4-FFF2-40B4-BE49-F238E27FC236}">
-                <a16:creationId xmlns:a16="http://schemas.microsoft.com/office/drawing/2014/main" id="{24BC0C04-5024-2076-BAFF-E620D13CE90B}"/>
-              </a:ext>
-            </a:extLst>
-          </p:cNvPr>
-          <p:cNvSpPr txBox="1"/>
+      <p:pic>
+        <p:nvPicPr>
+          <p:cNvPr id="21" name="Picture 20">
+            <a:extLst>
+              <a:ext uri="{FF2B5EF4-FFF2-40B4-BE49-F238E27FC236}">
+                <a16:creationId xmlns:a16="http://schemas.microsoft.com/office/drawing/2014/main" id="{C2DF4475-A32B-83BF-4A5F-CF1C29A29D78}"/>
+              </a:ext>
+            </a:extLst>
+          </p:cNvPr>
+          <p:cNvPicPr>
+            <a:picLocks noChangeAspect="1"/>
+          </p:cNvPicPr>
           <p:nvPr/>
-        </p:nvSpPr>
+        </p:nvPicPr>
+        <p:blipFill>
+          <a:blip r:embed="rId5"/>
+          <a:stretch>
+            <a:fillRect/>
+          </a:stretch>
+        </p:blipFill>
         <p:spPr>
           <a:xfrm>
-            <a:off x="2667000" y="0"/>
-            <a:ext cx="327334" cy="369332"/>
+            <a:off x="6268483" y="3244334"/>
+            <a:ext cx="3429000" cy="3429000"/>
           </a:xfrm>
           <a:prstGeom prst="rect">
             <a:avLst/>
           </a:prstGeom>
-          <a:noFill/>
         </p:spPr>
-        <p:txBody>
-          <a:bodyPr wrap="none" rtlCol="0">
-            <a:spAutoFit/>
-          </a:bodyPr>
-          <a:lstStyle/>
-          <a:p>
-            <a:r>
-              <a:rPr lang="en-US" b="1" dirty="0"/>
-              <a:t>A</a:t>
-            </a:r>
-          </a:p>
-        </p:txBody>
-      </p:sp>
-      <p:sp>
-        <p:nvSpPr>
-          <p:cNvPr id="11" name="TextBox 10">
-            <a:extLst>
-              <a:ext uri="{FF2B5EF4-FFF2-40B4-BE49-F238E27FC236}">
-                <a16:creationId xmlns:a16="http://schemas.microsoft.com/office/drawing/2014/main" id="{E912BDF5-E504-6125-C8B1-0D5C2CB98691}"/>
-              </a:ext>
-            </a:extLst>
-          </p:cNvPr>
-          <p:cNvSpPr txBox="1"/>
-          <p:nvPr/>
-        </p:nvSpPr>
-        <p:spPr>
-          <a:xfrm>
-            <a:off x="6096000" y="0"/>
-            <a:ext cx="327334" cy="369332"/>
-          </a:xfrm>
-          <a:prstGeom prst="rect">
-            <a:avLst/>
-          </a:prstGeom>
-          <a:noFill/>
-        </p:spPr>
-        <p:txBody>
-          <a:bodyPr wrap="none" rtlCol="0">
-            <a:spAutoFit/>
-          </a:bodyPr>
-          <a:lstStyle/>
-          <a:p>
-            <a:r>
-              <a:rPr lang="en-US" b="1" dirty="0"/>
-              <a:t>B</a:t>
-            </a:r>
-          </a:p>
-        </p:txBody>
-      </p:sp>
-      <p:sp>
-        <p:nvSpPr>
-          <p:cNvPr id="12" name="TextBox 11">
-            <a:extLst>
-              <a:ext uri="{FF2B5EF4-FFF2-40B4-BE49-F238E27FC236}">
-                <a16:creationId xmlns:a16="http://schemas.microsoft.com/office/drawing/2014/main" id="{623B0483-8F15-8F96-3ABB-C72B6809154E}"/>
-              </a:ext>
-            </a:extLst>
-          </p:cNvPr>
-          <p:cNvSpPr txBox="1"/>
-          <p:nvPr/>
-        </p:nvSpPr>
-        <p:spPr>
-          <a:xfrm>
-            <a:off x="6087184" y="3337035"/>
-            <a:ext cx="344966" cy="369332"/>
-          </a:xfrm>
-          <a:prstGeom prst="rect">
-            <a:avLst/>
-          </a:prstGeom>
-          <a:noFill/>
-        </p:spPr>
-        <p:txBody>
-          <a:bodyPr wrap="none" rtlCol="0">
-            <a:spAutoFit/>
-          </a:bodyPr>
-          <a:lstStyle/>
-          <a:p>
-            <a:r>
-              <a:rPr lang="en-US" b="1" dirty="0"/>
-              <a:t>C</a:t>
-            </a:r>
-          </a:p>
-        </p:txBody>
-      </p:sp>
+      </p:pic>
     </p:spTree>
     <p:extLst>
       <p:ext uri="{BB962C8B-B14F-4D97-AF65-F5344CB8AC3E}">

</xml_diff>